<commit_message>
Edits per Shivansh's feedback, etc.
</commit_message>
<xml_diff>
--- a/docs/deployment_guide/images/xq-message-zero-trust-gateway-arch-diag.pptx
+++ b/docs/deployment_guide/images/xq-message-zero-trust-gateway-arch-diag.pptx
@@ -6,6 +6,7 @@
   </p:sldMasterIdLst>
   <p:sldIdLst>
     <p:sldId id="257" r:id="rId2"/>
+    <p:sldId id="258" r:id="rId3"/>
   </p:sldIdLst>
   <p:sldSz cx="12192000" cy="6858000"/>
   <p:notesSz cx="6858000" cy="9144000"/>
@@ -105,6 +106,20 @@
     </a:lvl9pPr>
   </p:defaultTextStyle>
   <p:extLst>
+    <p:ext uri="{521415D9-36F7-43E2-AB2F-B90AF26B5E84}">
+      <p14:sectionLst xmlns:p14="http://schemas.microsoft.com/office/powerpoint/2010/main">
+        <p14:section name="Default Section" id="{BCE71DB6-D9C4-4B74-8809-5FFCCE33CC4E}">
+          <p14:sldIdLst>
+            <p14:sldId id="257"/>
+          </p14:sldIdLst>
+        </p14:section>
+        <p14:section name="OLD—Do not use" id="{67537E06-08A2-4CD9-9B04-F2E2F5106B9B}">
+          <p14:sldIdLst>
+            <p14:sldId id="258"/>
+          </p14:sldIdLst>
+        </p14:section>
+      </p14:sectionLst>
+    </p:ext>
     <p:ext uri="{EFAFB233-063F-42B5-8137-9DF3F51BA10A}">
       <p15:sldGuideLst xmlns:p15="http://schemas.microsoft.com/office/powerpoint/2012/main"/>
     </p:ext>
@@ -259,7 +274,7 @@
           <a:p>
             <a:fld id="{F8656426-244D-3C48-9A88-C407996A3916}" type="datetimeFigureOut">
               <a:rPr lang="en-US" smtClean="0"/>
-              <a:t>10/28/2022</a:t>
+              <a:t>11/7/2022</a:t>
             </a:fld>
             <a:endParaRPr lang="en-US"/>
           </a:p>
@@ -457,7 +472,7 @@
           <a:p>
             <a:fld id="{F8656426-244D-3C48-9A88-C407996A3916}" type="datetimeFigureOut">
               <a:rPr lang="en-US" smtClean="0"/>
-              <a:t>10/28/2022</a:t>
+              <a:t>11/7/2022</a:t>
             </a:fld>
             <a:endParaRPr lang="en-US"/>
           </a:p>
@@ -665,7 +680,7 @@
           <a:p>
             <a:fld id="{F8656426-244D-3C48-9A88-C407996A3916}" type="datetimeFigureOut">
               <a:rPr lang="en-US" smtClean="0"/>
-              <a:t>10/28/2022</a:t>
+              <a:t>11/7/2022</a:t>
             </a:fld>
             <a:endParaRPr lang="en-US"/>
           </a:p>
@@ -863,7 +878,7 @@
           <a:p>
             <a:fld id="{F8656426-244D-3C48-9A88-C407996A3916}" type="datetimeFigureOut">
               <a:rPr lang="en-US" smtClean="0"/>
-              <a:t>10/28/2022</a:t>
+              <a:t>11/7/2022</a:t>
             </a:fld>
             <a:endParaRPr lang="en-US"/>
           </a:p>
@@ -1138,7 +1153,7 @@
           <a:p>
             <a:fld id="{F8656426-244D-3C48-9A88-C407996A3916}" type="datetimeFigureOut">
               <a:rPr lang="en-US" smtClean="0"/>
-              <a:t>10/28/2022</a:t>
+              <a:t>11/7/2022</a:t>
             </a:fld>
             <a:endParaRPr lang="en-US"/>
           </a:p>
@@ -1403,7 +1418,7 @@
           <a:p>
             <a:fld id="{F8656426-244D-3C48-9A88-C407996A3916}" type="datetimeFigureOut">
               <a:rPr lang="en-US" smtClean="0"/>
-              <a:t>10/28/2022</a:t>
+              <a:t>11/7/2022</a:t>
             </a:fld>
             <a:endParaRPr lang="en-US"/>
           </a:p>
@@ -1815,7 +1830,7 @@
           <a:p>
             <a:fld id="{F8656426-244D-3C48-9A88-C407996A3916}" type="datetimeFigureOut">
               <a:rPr lang="en-US" smtClean="0"/>
-              <a:t>10/28/2022</a:t>
+              <a:t>11/7/2022</a:t>
             </a:fld>
             <a:endParaRPr lang="en-US"/>
           </a:p>
@@ -1956,7 +1971,7 @@
           <a:p>
             <a:fld id="{F8656426-244D-3C48-9A88-C407996A3916}" type="datetimeFigureOut">
               <a:rPr lang="en-US" smtClean="0"/>
-              <a:t>10/28/2022</a:t>
+              <a:t>11/7/2022</a:t>
             </a:fld>
             <a:endParaRPr lang="en-US"/>
           </a:p>
@@ -2069,7 +2084,7 @@
           <a:p>
             <a:fld id="{F8656426-244D-3C48-9A88-C407996A3916}" type="datetimeFigureOut">
               <a:rPr lang="en-US" smtClean="0"/>
-              <a:t>10/28/2022</a:t>
+              <a:t>11/7/2022</a:t>
             </a:fld>
             <a:endParaRPr lang="en-US"/>
           </a:p>
@@ -2380,7 +2395,7 @@
           <a:p>
             <a:fld id="{F8656426-244D-3C48-9A88-C407996A3916}" type="datetimeFigureOut">
               <a:rPr lang="en-US" smtClean="0"/>
-              <a:t>10/28/2022</a:t>
+              <a:t>11/7/2022</a:t>
             </a:fld>
             <a:endParaRPr lang="en-US"/>
           </a:p>
@@ -2668,7 +2683,7 @@
           <a:p>
             <a:fld id="{F8656426-244D-3C48-9A88-C407996A3916}" type="datetimeFigureOut">
               <a:rPr lang="en-US" smtClean="0"/>
-              <a:t>10/28/2022</a:t>
+              <a:t>11/7/2022</a:t>
             </a:fld>
             <a:endParaRPr lang="en-US"/>
           </a:p>
@@ -2909,7 +2924,7 @@
           <a:p>
             <a:fld id="{F8656426-244D-3C48-9A88-C407996A3916}" type="datetimeFigureOut">
               <a:rPr lang="en-US" smtClean="0"/>
-              <a:t>10/28/2022</a:t>
+              <a:t>11/7/2022</a:t>
             </a:fld>
             <a:endParaRPr lang="en-US"/>
           </a:p>
@@ -3340,6 +3355,2037 @@
         </p:nvSpPr>
         <p:spPr>
           <a:xfrm>
+            <a:off x="2379443" y="2147258"/>
+            <a:ext cx="1691005" cy="3184182"/>
+          </a:xfrm>
+          <a:prstGeom prst="rect">
+            <a:avLst/>
+          </a:prstGeom>
+          <a:solidFill>
+            <a:srgbClr val="1D8900">
+              <a:alpha val="9804"/>
+            </a:srgbClr>
+          </a:solidFill>
+          <a:ln w="12700">
+            <a:noFill/>
+            <a:prstDash val="dash"/>
+          </a:ln>
+        </p:spPr>
+        <p:style>
+          <a:lnRef idx="2">
+            <a:schemeClr val="accent1">
+              <a:shade val="50000"/>
+            </a:schemeClr>
+          </a:lnRef>
+          <a:fillRef idx="1">
+            <a:schemeClr val="accent1"/>
+          </a:fillRef>
+          <a:effectRef idx="0">
+            <a:schemeClr val="accent1"/>
+          </a:effectRef>
+          <a:fontRef idx="minor">
+            <a:schemeClr val="lt1"/>
+          </a:fontRef>
+        </p:style>
+        <p:txBody>
+          <a:bodyPr lIns="502920"/>
+          <a:lstStyle/>
+          <a:p>
+            <a:pPr eaLnBrk="1" fontAlgn="auto" hangingPunct="1">
+              <a:spcBef>
+                <a:spcPts val="0"/>
+              </a:spcBef>
+              <a:spcAft>
+                <a:spcPts val="0"/>
+              </a:spcAft>
+              <a:defRPr/>
+            </a:pPr>
+            <a:r>
+              <a:rPr lang="en-US" sz="1200" dirty="0">
+                <a:solidFill>
+                  <a:srgbClr val="1E8900"/>
+                </a:solidFill>
+                <a:latin typeface="Arial" panose="020B0604020202020204" pitchFamily="34" charset="0"/>
+                <a:cs typeface="Arial" panose="020B0604020202020204" pitchFamily="34" charset="0"/>
+              </a:rPr>
+              <a:t>Public subnet</a:t>
+            </a:r>
+          </a:p>
+        </p:txBody>
+      </p:sp>
+      <p:pic>
+        <p:nvPicPr>
+          <p:cNvPr id="5" name="Graphic 4">
+            <a:extLst>
+              <a:ext uri="{FF2B5EF4-FFF2-40B4-BE49-F238E27FC236}">
+                <a16:creationId xmlns:a16="http://schemas.microsoft.com/office/drawing/2014/main" id="{B8FBE515-92D2-9634-7D79-DC6000D7B8CD}"/>
+              </a:ext>
+            </a:extLst>
+          </p:cNvPr>
+          <p:cNvPicPr>
+            <a:picLocks noChangeAspect="1"/>
+          </p:cNvPicPr>
+          <p:nvPr/>
+        </p:nvPicPr>
+        <p:blipFill>
+          <a:blip r:embed="rId2">
+            <a:extLst>
+              <a:ext uri="{96DAC541-7B7A-43D3-8B79-37D633B846F1}">
+                <asvg:svgBlip xmlns:asvg="http://schemas.microsoft.com/office/drawing/2016/SVG/main" r:embed="rId3"/>
+              </a:ext>
+            </a:extLst>
+          </a:blip>
+          <a:stretch>
+            <a:fillRect/>
+          </a:stretch>
+        </p:blipFill>
+        <p:spPr>
+          <a:xfrm>
+            <a:off x="2380078" y="2148848"/>
+            <a:ext cx="381000" cy="381000"/>
+          </a:xfrm>
+          <a:prstGeom prst="rect">
+            <a:avLst/>
+          </a:prstGeom>
+        </p:spPr>
+      </p:pic>
+      <p:sp>
+        <p:nvSpPr>
+          <p:cNvPr id="6" name="Rectangle 5">
+            <a:extLst>
+              <a:ext uri="{FF2B5EF4-FFF2-40B4-BE49-F238E27FC236}">
+                <a16:creationId xmlns:a16="http://schemas.microsoft.com/office/drawing/2014/main" id="{C50453FE-7DAA-AC2C-96FD-5F0CA9EF586B}"/>
+              </a:ext>
+            </a:extLst>
+          </p:cNvPr>
+          <p:cNvSpPr/>
+          <p:nvPr/>
+        </p:nvSpPr>
+        <p:spPr>
+          <a:xfrm>
+            <a:off x="5768218" y="2147258"/>
+            <a:ext cx="1691005" cy="3184181"/>
+          </a:xfrm>
+          <a:prstGeom prst="rect">
+            <a:avLst/>
+          </a:prstGeom>
+          <a:solidFill>
+            <a:srgbClr val="1D8900">
+              <a:alpha val="9804"/>
+            </a:srgbClr>
+          </a:solidFill>
+          <a:ln w="12700">
+            <a:noFill/>
+            <a:prstDash val="dash"/>
+          </a:ln>
+        </p:spPr>
+        <p:style>
+          <a:lnRef idx="2">
+            <a:schemeClr val="accent1">
+              <a:shade val="50000"/>
+            </a:schemeClr>
+          </a:lnRef>
+          <a:fillRef idx="1">
+            <a:schemeClr val="accent1"/>
+          </a:fillRef>
+          <a:effectRef idx="0">
+            <a:schemeClr val="accent1"/>
+          </a:effectRef>
+          <a:fontRef idx="minor">
+            <a:schemeClr val="lt1"/>
+          </a:fontRef>
+        </p:style>
+        <p:txBody>
+          <a:bodyPr lIns="502920"/>
+          <a:lstStyle/>
+          <a:p>
+            <a:pPr eaLnBrk="1" fontAlgn="auto" hangingPunct="1">
+              <a:spcBef>
+                <a:spcPts val="0"/>
+              </a:spcBef>
+              <a:spcAft>
+                <a:spcPts val="0"/>
+              </a:spcAft>
+              <a:defRPr/>
+            </a:pPr>
+            <a:r>
+              <a:rPr lang="en-US" sz="1200" dirty="0">
+                <a:solidFill>
+                  <a:srgbClr val="1E8900"/>
+                </a:solidFill>
+                <a:latin typeface="Arial" panose="020B0604020202020204" pitchFamily="34" charset="0"/>
+                <a:cs typeface="Arial" panose="020B0604020202020204" pitchFamily="34" charset="0"/>
+              </a:rPr>
+              <a:t>Public subnet</a:t>
+            </a:r>
+          </a:p>
+        </p:txBody>
+      </p:sp>
+      <p:pic>
+        <p:nvPicPr>
+          <p:cNvPr id="7" name="Graphic 6">
+            <a:extLst>
+              <a:ext uri="{FF2B5EF4-FFF2-40B4-BE49-F238E27FC236}">
+                <a16:creationId xmlns:a16="http://schemas.microsoft.com/office/drawing/2014/main" id="{7CDB886F-3630-8B57-4436-0D47172C4CCC}"/>
+              </a:ext>
+            </a:extLst>
+          </p:cNvPr>
+          <p:cNvPicPr>
+            <a:picLocks noChangeAspect="1"/>
+          </p:cNvPicPr>
+          <p:nvPr/>
+        </p:nvPicPr>
+        <p:blipFill>
+          <a:blip r:embed="rId2">
+            <a:extLst>
+              <a:ext uri="{96DAC541-7B7A-43D3-8B79-37D633B846F1}">
+                <asvg:svgBlip xmlns:asvg="http://schemas.microsoft.com/office/drawing/2016/SVG/main" r:embed="rId3"/>
+              </a:ext>
+            </a:extLst>
+          </a:blip>
+          <a:stretch>
+            <a:fillRect/>
+          </a:stretch>
+        </p:blipFill>
+        <p:spPr>
+          <a:xfrm>
+            <a:off x="5768853" y="2148848"/>
+            <a:ext cx="381000" cy="381000"/>
+          </a:xfrm>
+          <a:prstGeom prst="rect">
+            <a:avLst/>
+          </a:prstGeom>
+        </p:spPr>
+      </p:pic>
+      <p:sp>
+        <p:nvSpPr>
+          <p:cNvPr id="9" name="TextBox 16">
+            <a:extLst>
+              <a:ext uri="{FF2B5EF4-FFF2-40B4-BE49-F238E27FC236}">
+                <a16:creationId xmlns:a16="http://schemas.microsoft.com/office/drawing/2014/main" id="{648EE7EE-DED8-5A24-F19A-D16774BC3244}"/>
+              </a:ext>
+            </a:extLst>
+          </p:cNvPr>
+          <p:cNvSpPr txBox="1">
+            <a:spLocks noChangeArrowheads="1"/>
+          </p:cNvSpPr>
+          <p:nvPr/>
+        </p:nvSpPr>
+        <p:spPr bwMode="auto">
+          <a:xfrm>
+            <a:off x="2666505" y="3846867"/>
+            <a:ext cx="1115568" cy="430887"/>
+          </a:xfrm>
+          <a:prstGeom prst="rect">
+            <a:avLst/>
+          </a:prstGeom>
+          <a:noFill/>
+          <a:ln>
+            <a:noFill/>
+          </a:ln>
+          <a:extLst>
+            <a:ext uri="{909E8E84-426E-40DD-AFC4-6F175D3DCCD1}">
+              <a14:hiddenFill xmlns:a14="http://schemas.microsoft.com/office/drawing/2010/main">
+                <a:solidFill>
+                  <a:srgbClr val="FFFFFF"/>
+                </a:solidFill>
+              </a14:hiddenFill>
+            </a:ext>
+            <a:ext uri="{91240B29-F687-4F45-9708-019B960494DF}">
+              <a14:hiddenLine xmlns:a14="http://schemas.microsoft.com/office/drawing/2010/main" w="9525">
+                <a:solidFill>
+                  <a:srgbClr val="000000"/>
+                </a:solidFill>
+                <a:miter lim="800000"/>
+                <a:headEnd/>
+                <a:tailEnd/>
+              </a14:hiddenLine>
+            </a:ext>
+          </a:extLst>
+        </p:spPr>
+        <p:txBody>
+          <a:bodyPr wrap="square" lIns="0" rIns="0">
+            <a:spAutoFit/>
+          </a:bodyPr>
+          <a:lstStyle>
+            <a:lvl1pPr>
+              <a:defRPr>
+                <a:solidFill>
+                  <a:schemeClr val="tx1"/>
+                </a:solidFill>
+                <a:latin typeface="Calibri" panose="020F0502020204030204" pitchFamily="34" charset="0"/>
+              </a:defRPr>
+            </a:lvl1pPr>
+            <a:lvl2pPr marL="742950" indent="-285750">
+              <a:defRPr>
+                <a:solidFill>
+                  <a:schemeClr val="tx1"/>
+                </a:solidFill>
+                <a:latin typeface="Calibri" panose="020F0502020204030204" pitchFamily="34" charset="0"/>
+              </a:defRPr>
+            </a:lvl2pPr>
+            <a:lvl3pPr marL="1143000" indent="-228600">
+              <a:defRPr>
+                <a:solidFill>
+                  <a:schemeClr val="tx1"/>
+                </a:solidFill>
+                <a:latin typeface="Calibri" panose="020F0502020204030204" pitchFamily="34" charset="0"/>
+              </a:defRPr>
+            </a:lvl3pPr>
+            <a:lvl4pPr marL="1600200" indent="-228600">
+              <a:defRPr>
+                <a:solidFill>
+                  <a:schemeClr val="tx1"/>
+                </a:solidFill>
+                <a:latin typeface="Calibri" panose="020F0502020204030204" pitchFamily="34" charset="0"/>
+              </a:defRPr>
+            </a:lvl4pPr>
+            <a:lvl5pPr marL="2057400" indent="-228600">
+              <a:defRPr>
+                <a:solidFill>
+                  <a:schemeClr val="tx1"/>
+                </a:solidFill>
+                <a:latin typeface="Calibri" panose="020F0502020204030204" pitchFamily="34" charset="0"/>
+              </a:defRPr>
+            </a:lvl5pPr>
+            <a:lvl6pPr marL="2514600" indent="-228600" eaLnBrk="0" fontAlgn="base" hangingPunct="0">
+              <a:spcBef>
+                <a:spcPct val="0"/>
+              </a:spcBef>
+              <a:spcAft>
+                <a:spcPct val="0"/>
+              </a:spcAft>
+              <a:defRPr>
+                <a:solidFill>
+                  <a:schemeClr val="tx1"/>
+                </a:solidFill>
+                <a:latin typeface="Calibri" panose="020F0502020204030204" pitchFamily="34" charset="0"/>
+              </a:defRPr>
+            </a:lvl6pPr>
+            <a:lvl7pPr marL="2971800" indent="-228600" eaLnBrk="0" fontAlgn="base" hangingPunct="0">
+              <a:spcBef>
+                <a:spcPct val="0"/>
+              </a:spcBef>
+              <a:spcAft>
+                <a:spcPct val="0"/>
+              </a:spcAft>
+              <a:defRPr>
+                <a:solidFill>
+                  <a:schemeClr val="tx1"/>
+                </a:solidFill>
+                <a:latin typeface="Calibri" panose="020F0502020204030204" pitchFamily="34" charset="0"/>
+              </a:defRPr>
+            </a:lvl7pPr>
+            <a:lvl8pPr marL="3429000" indent="-228600" eaLnBrk="0" fontAlgn="base" hangingPunct="0">
+              <a:spcBef>
+                <a:spcPct val="0"/>
+              </a:spcBef>
+              <a:spcAft>
+                <a:spcPct val="0"/>
+              </a:spcAft>
+              <a:defRPr>
+                <a:solidFill>
+                  <a:schemeClr val="tx1"/>
+                </a:solidFill>
+                <a:latin typeface="Calibri" panose="020F0502020204030204" pitchFamily="34" charset="0"/>
+              </a:defRPr>
+            </a:lvl8pPr>
+            <a:lvl9pPr marL="3886200" indent="-228600" eaLnBrk="0" fontAlgn="base" hangingPunct="0">
+              <a:spcBef>
+                <a:spcPct val="0"/>
+              </a:spcBef>
+              <a:spcAft>
+                <a:spcPct val="0"/>
+              </a:spcAft>
+              <a:defRPr>
+                <a:solidFill>
+                  <a:schemeClr val="tx1"/>
+                </a:solidFill>
+                <a:latin typeface="Calibri" panose="020F0502020204030204" pitchFamily="34" charset="0"/>
+              </a:defRPr>
+            </a:lvl9pPr>
+          </a:lstStyle>
+          <a:p>
+            <a:pPr algn="ctr" eaLnBrk="1" hangingPunct="1"/>
+            <a:r>
+              <a:rPr lang="en-US" altLang="en-US" sz="1100" dirty="0">
+                <a:latin typeface="Arial" panose="020B0604020202020204" pitchFamily="34" charset="0"/>
+                <a:ea typeface="Amazon Ember" panose="020B0603020204020204" pitchFamily="34" charset="0"/>
+                <a:cs typeface="Arial" panose="020B0604020202020204" pitchFamily="34" charset="0"/>
+              </a:rPr>
+              <a:t>XQ Zero-Trust Gateway</a:t>
+            </a:r>
+          </a:p>
+        </p:txBody>
+      </p:sp>
+      <p:pic>
+        <p:nvPicPr>
+          <p:cNvPr id="10" name="Graphic 42">
+            <a:extLst>
+              <a:ext uri="{FF2B5EF4-FFF2-40B4-BE49-F238E27FC236}">
+                <a16:creationId xmlns:a16="http://schemas.microsoft.com/office/drawing/2014/main" id="{9A7EDB0D-BCA2-4E04-8B8C-AB8CD27B9F91}"/>
+              </a:ext>
+            </a:extLst>
+          </p:cNvPr>
+          <p:cNvPicPr>
+            <a:picLocks noChangeAspect="1" noChangeArrowheads="1"/>
+          </p:cNvPicPr>
+          <p:nvPr/>
+        </p:nvPicPr>
+        <p:blipFill>
+          <a:blip r:embed="rId4">
+            <a:extLst>
+              <a:ext uri="{28A0092B-C50C-407E-A947-70E740481C1C}">
+                <a14:useLocalDpi xmlns:a14="http://schemas.microsoft.com/office/drawing/2010/main" val="0"/>
+              </a:ext>
+            </a:extLst>
+          </a:blip>
+          <a:srcRect/>
+          <a:stretch>
+            <a:fillRect/>
+          </a:stretch>
+        </p:blipFill>
+        <p:spPr bwMode="auto">
+          <a:xfrm>
+            <a:off x="2995689" y="2484235"/>
+            <a:ext cx="457200" cy="457200"/>
+          </a:xfrm>
+          <a:prstGeom prst="rect">
+            <a:avLst/>
+          </a:prstGeom>
+          <a:noFill/>
+          <a:ln>
+            <a:noFill/>
+          </a:ln>
+          <a:extLst>
+            <a:ext uri="{909E8E84-426E-40DD-AFC4-6F175D3DCCD1}">
+              <a14:hiddenFill xmlns:a14="http://schemas.microsoft.com/office/drawing/2010/main">
+                <a:solidFill>
+                  <a:srgbClr val="FFFFFF"/>
+                </a:solidFill>
+              </a14:hiddenFill>
+            </a:ext>
+            <a:ext uri="{91240B29-F687-4F45-9708-019B960494DF}">
+              <a14:hiddenLine xmlns:a14="http://schemas.microsoft.com/office/drawing/2010/main" w="9525">
+                <a:solidFill>
+                  <a:srgbClr val="000000"/>
+                </a:solidFill>
+                <a:miter lim="800000"/>
+                <a:headEnd/>
+                <a:tailEnd/>
+              </a14:hiddenLine>
+            </a:ext>
+          </a:extLst>
+        </p:spPr>
+      </p:pic>
+      <p:sp>
+        <p:nvSpPr>
+          <p:cNvPr id="11" name="TextBox 16">
+            <a:extLst>
+              <a:ext uri="{FF2B5EF4-FFF2-40B4-BE49-F238E27FC236}">
+                <a16:creationId xmlns:a16="http://schemas.microsoft.com/office/drawing/2014/main" id="{CE490174-0238-355E-5AAC-9C1E314A0D8F}"/>
+              </a:ext>
+            </a:extLst>
+          </p:cNvPr>
+          <p:cNvSpPr txBox="1">
+            <a:spLocks noChangeArrowheads="1"/>
+          </p:cNvSpPr>
+          <p:nvPr/>
+        </p:nvSpPr>
+        <p:spPr bwMode="auto">
+          <a:xfrm>
+            <a:off x="2563016" y="2848711"/>
+            <a:ext cx="1322546" cy="261610"/>
+          </a:xfrm>
+          <a:prstGeom prst="rect">
+            <a:avLst/>
+          </a:prstGeom>
+          <a:noFill/>
+          <a:ln>
+            <a:noFill/>
+          </a:ln>
+          <a:extLst>
+            <a:ext uri="{909E8E84-426E-40DD-AFC4-6F175D3DCCD1}">
+              <a14:hiddenFill xmlns:a14="http://schemas.microsoft.com/office/drawing/2010/main">
+                <a:solidFill>
+                  <a:srgbClr val="FFFFFF"/>
+                </a:solidFill>
+              </a14:hiddenFill>
+            </a:ext>
+            <a:ext uri="{91240B29-F687-4F45-9708-019B960494DF}">
+              <a14:hiddenLine xmlns:a14="http://schemas.microsoft.com/office/drawing/2010/main" w="9525">
+                <a:solidFill>
+                  <a:srgbClr val="000000"/>
+                </a:solidFill>
+                <a:miter lim="800000"/>
+                <a:headEnd/>
+                <a:tailEnd/>
+              </a14:hiddenLine>
+            </a:ext>
+          </a:extLst>
+        </p:spPr>
+        <p:txBody>
+          <a:bodyPr wrap="square" lIns="0" rIns="0">
+            <a:spAutoFit/>
+          </a:bodyPr>
+          <a:lstStyle>
+            <a:lvl1pPr>
+              <a:defRPr>
+                <a:solidFill>
+                  <a:schemeClr val="tx1"/>
+                </a:solidFill>
+                <a:latin typeface="Calibri" panose="020F0502020204030204" pitchFamily="34" charset="0"/>
+              </a:defRPr>
+            </a:lvl1pPr>
+            <a:lvl2pPr marL="742950" indent="-285750">
+              <a:defRPr>
+                <a:solidFill>
+                  <a:schemeClr val="tx1"/>
+                </a:solidFill>
+                <a:latin typeface="Calibri" panose="020F0502020204030204" pitchFamily="34" charset="0"/>
+              </a:defRPr>
+            </a:lvl2pPr>
+            <a:lvl3pPr marL="1143000" indent="-228600">
+              <a:defRPr>
+                <a:solidFill>
+                  <a:schemeClr val="tx1"/>
+                </a:solidFill>
+                <a:latin typeface="Calibri" panose="020F0502020204030204" pitchFamily="34" charset="0"/>
+              </a:defRPr>
+            </a:lvl3pPr>
+            <a:lvl4pPr marL="1600200" indent="-228600">
+              <a:defRPr>
+                <a:solidFill>
+                  <a:schemeClr val="tx1"/>
+                </a:solidFill>
+                <a:latin typeface="Calibri" panose="020F0502020204030204" pitchFamily="34" charset="0"/>
+              </a:defRPr>
+            </a:lvl4pPr>
+            <a:lvl5pPr marL="2057400" indent="-228600">
+              <a:defRPr>
+                <a:solidFill>
+                  <a:schemeClr val="tx1"/>
+                </a:solidFill>
+                <a:latin typeface="Calibri" panose="020F0502020204030204" pitchFamily="34" charset="0"/>
+              </a:defRPr>
+            </a:lvl5pPr>
+            <a:lvl6pPr marL="2514600" indent="-228600" eaLnBrk="0" fontAlgn="base" hangingPunct="0">
+              <a:spcBef>
+                <a:spcPct val="0"/>
+              </a:spcBef>
+              <a:spcAft>
+                <a:spcPct val="0"/>
+              </a:spcAft>
+              <a:defRPr>
+                <a:solidFill>
+                  <a:schemeClr val="tx1"/>
+                </a:solidFill>
+                <a:latin typeface="Calibri" panose="020F0502020204030204" pitchFamily="34" charset="0"/>
+              </a:defRPr>
+            </a:lvl6pPr>
+            <a:lvl7pPr marL="2971800" indent="-228600" eaLnBrk="0" fontAlgn="base" hangingPunct="0">
+              <a:spcBef>
+                <a:spcPct val="0"/>
+              </a:spcBef>
+              <a:spcAft>
+                <a:spcPct val="0"/>
+              </a:spcAft>
+              <a:defRPr>
+                <a:solidFill>
+                  <a:schemeClr val="tx1"/>
+                </a:solidFill>
+                <a:latin typeface="Calibri" panose="020F0502020204030204" pitchFamily="34" charset="0"/>
+              </a:defRPr>
+            </a:lvl7pPr>
+            <a:lvl8pPr marL="3429000" indent="-228600" eaLnBrk="0" fontAlgn="base" hangingPunct="0">
+              <a:spcBef>
+                <a:spcPct val="0"/>
+              </a:spcBef>
+              <a:spcAft>
+                <a:spcPct val="0"/>
+              </a:spcAft>
+              <a:defRPr>
+                <a:solidFill>
+                  <a:schemeClr val="tx1"/>
+                </a:solidFill>
+                <a:latin typeface="Calibri" panose="020F0502020204030204" pitchFamily="34" charset="0"/>
+              </a:defRPr>
+            </a:lvl8pPr>
+            <a:lvl9pPr marL="3886200" indent="-228600" eaLnBrk="0" fontAlgn="base" hangingPunct="0">
+              <a:spcBef>
+                <a:spcPct val="0"/>
+              </a:spcBef>
+              <a:spcAft>
+                <a:spcPct val="0"/>
+              </a:spcAft>
+              <a:defRPr>
+                <a:solidFill>
+                  <a:schemeClr val="tx1"/>
+                </a:solidFill>
+                <a:latin typeface="Calibri" panose="020F0502020204030204" pitchFamily="34" charset="0"/>
+              </a:defRPr>
+            </a:lvl9pPr>
+          </a:lstStyle>
+          <a:p>
+            <a:pPr algn="ctr" eaLnBrk="1" hangingPunct="1"/>
+            <a:r>
+              <a:rPr lang="en-US" altLang="en-US" sz="1100" dirty="0">
+                <a:latin typeface="Arial" panose="020B0604020202020204" pitchFamily="34" charset="0"/>
+                <a:ea typeface="Amazon Ember" panose="020B0603020204020204" pitchFamily="34" charset="0"/>
+                <a:cs typeface="Arial" panose="020B0604020202020204" pitchFamily="34" charset="0"/>
+              </a:rPr>
+              <a:t>Elastic IP address</a:t>
+            </a:r>
+          </a:p>
+        </p:txBody>
+      </p:sp>
+      <p:cxnSp>
+        <p:nvCxnSpPr>
+          <p:cNvPr id="12" name="Straight Arrow Connector 11">
+            <a:extLst>
+              <a:ext uri="{FF2B5EF4-FFF2-40B4-BE49-F238E27FC236}">
+                <a16:creationId xmlns:a16="http://schemas.microsoft.com/office/drawing/2014/main" id="{CDF7B290-3282-4F7B-6107-05B85029757B}"/>
+              </a:ext>
+            </a:extLst>
+          </p:cNvPr>
+          <p:cNvCxnSpPr>
+            <a:cxnSpLocks/>
+            <a:stCxn id="11" idx="2"/>
+            <a:endCxn id="40" idx="0"/>
+          </p:cNvCxnSpPr>
+          <p:nvPr/>
+        </p:nvCxnSpPr>
+        <p:spPr>
+          <a:xfrm>
+            <a:off x="3224289" y="3110321"/>
+            <a:ext cx="0" cy="263882"/>
+          </a:xfrm>
+          <a:prstGeom prst="straightConnector1">
+            <a:avLst/>
+          </a:prstGeom>
+          <a:ln w="12700">
+            <a:solidFill>
+              <a:srgbClr val="545B64"/>
+            </a:solidFill>
+            <a:headEnd type="none" w="med" len="sm"/>
+            <a:tailEnd type="arrow" w="med" len="sm"/>
+          </a:ln>
+        </p:spPr>
+        <p:style>
+          <a:lnRef idx="1">
+            <a:schemeClr val="accent1"/>
+          </a:lnRef>
+          <a:fillRef idx="0">
+            <a:schemeClr val="accent1"/>
+          </a:fillRef>
+          <a:effectRef idx="0">
+            <a:schemeClr val="accent1"/>
+          </a:effectRef>
+          <a:fontRef idx="minor">
+            <a:schemeClr val="tx1"/>
+          </a:fontRef>
+        </p:style>
+      </p:cxnSp>
+      <p:sp>
+        <p:nvSpPr>
+          <p:cNvPr id="16" name="TextBox 15">
+            <a:extLst>
+              <a:ext uri="{FF2B5EF4-FFF2-40B4-BE49-F238E27FC236}">
+                <a16:creationId xmlns:a16="http://schemas.microsoft.com/office/drawing/2014/main" id="{F8FED8FC-D678-FF77-CA7C-5988A2D4799C}"/>
+              </a:ext>
+            </a:extLst>
+          </p:cNvPr>
+          <p:cNvSpPr txBox="1">
+            <a:spLocks noChangeArrowheads="1"/>
+          </p:cNvSpPr>
+          <p:nvPr/>
+        </p:nvSpPr>
+        <p:spPr bwMode="auto">
+          <a:xfrm>
+            <a:off x="2673842" y="5027297"/>
+            <a:ext cx="1100894" cy="261610"/>
+          </a:xfrm>
+          <a:prstGeom prst="rect">
+            <a:avLst/>
+          </a:prstGeom>
+          <a:noFill/>
+          <a:ln>
+            <a:noFill/>
+          </a:ln>
+          <a:extLst>
+            <a:ext uri="{909E8E84-426E-40DD-AFC4-6F175D3DCCD1}">
+              <a14:hiddenFill xmlns:a14="http://schemas.microsoft.com/office/drawing/2010/main">
+                <a:solidFill>
+                  <a:srgbClr val="FFFFFF"/>
+                </a:solidFill>
+              </a14:hiddenFill>
+            </a:ext>
+            <a:ext uri="{91240B29-F687-4F45-9708-019B960494DF}">
+              <a14:hiddenLine xmlns:a14="http://schemas.microsoft.com/office/drawing/2010/main" w="9525">
+                <a:solidFill>
+                  <a:srgbClr val="000000"/>
+                </a:solidFill>
+                <a:miter lim="800000"/>
+                <a:headEnd/>
+                <a:tailEnd/>
+              </a14:hiddenLine>
+            </a:ext>
+          </a:extLst>
+        </p:spPr>
+        <p:txBody>
+          <a:bodyPr wrap="square">
+            <a:spAutoFit/>
+          </a:bodyPr>
+          <a:lstStyle>
+            <a:lvl1pPr>
+              <a:defRPr>
+                <a:solidFill>
+                  <a:schemeClr val="tx1"/>
+                </a:solidFill>
+                <a:latin typeface="Calibri" panose="020F0502020204030204" pitchFamily="34" charset="0"/>
+              </a:defRPr>
+            </a:lvl1pPr>
+            <a:lvl2pPr marL="742950" indent="-285750">
+              <a:defRPr>
+                <a:solidFill>
+                  <a:schemeClr val="tx1"/>
+                </a:solidFill>
+                <a:latin typeface="Calibri" panose="020F0502020204030204" pitchFamily="34" charset="0"/>
+              </a:defRPr>
+            </a:lvl2pPr>
+            <a:lvl3pPr marL="1143000" indent="-228600">
+              <a:defRPr>
+                <a:solidFill>
+                  <a:schemeClr val="tx1"/>
+                </a:solidFill>
+                <a:latin typeface="Calibri" panose="020F0502020204030204" pitchFamily="34" charset="0"/>
+              </a:defRPr>
+            </a:lvl3pPr>
+            <a:lvl4pPr marL="1600200" indent="-228600">
+              <a:defRPr>
+                <a:solidFill>
+                  <a:schemeClr val="tx1"/>
+                </a:solidFill>
+                <a:latin typeface="Calibri" panose="020F0502020204030204" pitchFamily="34" charset="0"/>
+              </a:defRPr>
+            </a:lvl4pPr>
+            <a:lvl5pPr marL="2057400" indent="-228600">
+              <a:defRPr>
+                <a:solidFill>
+                  <a:schemeClr val="tx1"/>
+                </a:solidFill>
+                <a:latin typeface="Calibri" panose="020F0502020204030204" pitchFamily="34" charset="0"/>
+              </a:defRPr>
+            </a:lvl5pPr>
+            <a:lvl6pPr marL="2514600" indent="-228600" eaLnBrk="0" fontAlgn="base" hangingPunct="0">
+              <a:spcBef>
+                <a:spcPct val="0"/>
+              </a:spcBef>
+              <a:spcAft>
+                <a:spcPct val="0"/>
+              </a:spcAft>
+              <a:defRPr>
+                <a:solidFill>
+                  <a:schemeClr val="tx1"/>
+                </a:solidFill>
+                <a:latin typeface="Calibri" panose="020F0502020204030204" pitchFamily="34" charset="0"/>
+              </a:defRPr>
+            </a:lvl6pPr>
+            <a:lvl7pPr marL="2971800" indent="-228600" eaLnBrk="0" fontAlgn="base" hangingPunct="0">
+              <a:spcBef>
+                <a:spcPct val="0"/>
+              </a:spcBef>
+              <a:spcAft>
+                <a:spcPct val="0"/>
+              </a:spcAft>
+              <a:defRPr>
+                <a:solidFill>
+                  <a:schemeClr val="tx1"/>
+                </a:solidFill>
+                <a:latin typeface="Calibri" panose="020F0502020204030204" pitchFamily="34" charset="0"/>
+              </a:defRPr>
+            </a:lvl7pPr>
+            <a:lvl8pPr marL="3429000" indent="-228600" eaLnBrk="0" fontAlgn="base" hangingPunct="0">
+              <a:spcBef>
+                <a:spcPct val="0"/>
+              </a:spcBef>
+              <a:spcAft>
+                <a:spcPct val="0"/>
+              </a:spcAft>
+              <a:defRPr>
+                <a:solidFill>
+                  <a:schemeClr val="tx1"/>
+                </a:solidFill>
+                <a:latin typeface="Calibri" panose="020F0502020204030204" pitchFamily="34" charset="0"/>
+              </a:defRPr>
+            </a:lvl8pPr>
+            <a:lvl9pPr marL="3886200" indent="-228600" eaLnBrk="0" fontAlgn="base" hangingPunct="0">
+              <a:spcBef>
+                <a:spcPct val="0"/>
+              </a:spcBef>
+              <a:spcAft>
+                <a:spcPct val="0"/>
+              </a:spcAft>
+              <a:defRPr>
+                <a:solidFill>
+                  <a:schemeClr val="tx1"/>
+                </a:solidFill>
+                <a:latin typeface="Calibri" panose="020F0502020204030204" pitchFamily="34" charset="0"/>
+              </a:defRPr>
+            </a:lvl9pPr>
+          </a:lstStyle>
+          <a:p>
+            <a:pPr algn="ctr" eaLnBrk="1" hangingPunct="1"/>
+            <a:r>
+              <a:rPr lang="en-US" altLang="en-US" sz="1100" dirty="0">
+                <a:latin typeface="Arial" panose="020B0604020202020204" pitchFamily="34" charset="0"/>
+                <a:ea typeface="Amazon Ember" panose="020B0603020204020204" pitchFamily="34" charset="0"/>
+                <a:cs typeface="Arial" panose="020B0604020202020204" pitchFamily="34" charset="0"/>
+              </a:rPr>
+              <a:t>AWS SFTP</a:t>
+            </a:r>
+          </a:p>
+        </p:txBody>
+      </p:sp>
+      <p:pic>
+        <p:nvPicPr>
+          <p:cNvPr id="17" name="Graphic 22">
+            <a:extLst>
+              <a:ext uri="{FF2B5EF4-FFF2-40B4-BE49-F238E27FC236}">
+                <a16:creationId xmlns:a16="http://schemas.microsoft.com/office/drawing/2014/main" id="{416CCBC6-38C4-454A-8431-1C03592FFB2A}"/>
+              </a:ext>
+            </a:extLst>
+          </p:cNvPr>
+          <p:cNvPicPr>
+            <a:picLocks noChangeAspect="1" noChangeArrowheads="1"/>
+          </p:cNvPicPr>
+          <p:nvPr/>
+        </p:nvPicPr>
+        <p:blipFill>
+          <a:blip r:embed="rId5">
+            <a:extLst>
+              <a:ext uri="{28A0092B-C50C-407E-A947-70E740481C1C}">
+                <a14:useLocalDpi xmlns:a14="http://schemas.microsoft.com/office/drawing/2010/main" val="0"/>
+              </a:ext>
+            </a:extLst>
+          </a:blip>
+          <a:srcRect/>
+          <a:stretch>
+            <a:fillRect/>
+          </a:stretch>
+        </p:blipFill>
+        <p:spPr bwMode="auto">
+          <a:xfrm>
+            <a:off x="2995689" y="4545767"/>
+            <a:ext cx="457200" cy="457200"/>
+          </a:xfrm>
+          <a:prstGeom prst="rect">
+            <a:avLst/>
+          </a:prstGeom>
+          <a:noFill/>
+          <a:ln>
+            <a:noFill/>
+          </a:ln>
+          <a:extLst>
+            <a:ext uri="{909E8E84-426E-40DD-AFC4-6F175D3DCCD1}">
+              <a14:hiddenFill xmlns:a14="http://schemas.microsoft.com/office/drawing/2010/main">
+                <a:solidFill>
+                  <a:srgbClr val="FFFFFF"/>
+                </a:solidFill>
+              </a14:hiddenFill>
+            </a:ext>
+            <a:ext uri="{91240B29-F687-4F45-9708-019B960494DF}">
+              <a14:hiddenLine xmlns:a14="http://schemas.microsoft.com/office/drawing/2010/main" w="9525">
+                <a:solidFill>
+                  <a:srgbClr val="000000"/>
+                </a:solidFill>
+                <a:miter lim="800000"/>
+                <a:headEnd/>
+                <a:tailEnd/>
+              </a14:hiddenLine>
+            </a:ext>
+          </a:extLst>
+        </p:spPr>
+      </p:pic>
+      <p:sp>
+        <p:nvSpPr>
+          <p:cNvPr id="18" name="TextBox 17">
+            <a:extLst>
+              <a:ext uri="{FF2B5EF4-FFF2-40B4-BE49-F238E27FC236}">
+                <a16:creationId xmlns:a16="http://schemas.microsoft.com/office/drawing/2014/main" id="{B1C965C0-3EEC-67AB-6920-11E163AB3779}"/>
+              </a:ext>
+            </a:extLst>
+          </p:cNvPr>
+          <p:cNvSpPr txBox="1">
+            <a:spLocks noChangeArrowheads="1"/>
+          </p:cNvSpPr>
+          <p:nvPr/>
+        </p:nvSpPr>
+        <p:spPr bwMode="auto">
+          <a:xfrm>
+            <a:off x="6064128" y="5027297"/>
+            <a:ext cx="1100894" cy="261610"/>
+          </a:xfrm>
+          <a:prstGeom prst="rect">
+            <a:avLst/>
+          </a:prstGeom>
+          <a:noFill/>
+          <a:ln>
+            <a:noFill/>
+          </a:ln>
+          <a:extLst>
+            <a:ext uri="{909E8E84-426E-40DD-AFC4-6F175D3DCCD1}">
+              <a14:hiddenFill xmlns:a14="http://schemas.microsoft.com/office/drawing/2010/main">
+                <a:solidFill>
+                  <a:srgbClr val="FFFFFF"/>
+                </a:solidFill>
+              </a14:hiddenFill>
+            </a:ext>
+            <a:ext uri="{91240B29-F687-4F45-9708-019B960494DF}">
+              <a14:hiddenLine xmlns:a14="http://schemas.microsoft.com/office/drawing/2010/main" w="9525">
+                <a:solidFill>
+                  <a:srgbClr val="000000"/>
+                </a:solidFill>
+                <a:miter lim="800000"/>
+                <a:headEnd/>
+                <a:tailEnd/>
+              </a14:hiddenLine>
+            </a:ext>
+          </a:extLst>
+        </p:spPr>
+        <p:txBody>
+          <a:bodyPr wrap="square">
+            <a:spAutoFit/>
+          </a:bodyPr>
+          <a:lstStyle>
+            <a:lvl1pPr>
+              <a:defRPr>
+                <a:solidFill>
+                  <a:schemeClr val="tx1"/>
+                </a:solidFill>
+                <a:latin typeface="Calibri" panose="020F0502020204030204" pitchFamily="34" charset="0"/>
+              </a:defRPr>
+            </a:lvl1pPr>
+            <a:lvl2pPr marL="742950" indent="-285750">
+              <a:defRPr>
+                <a:solidFill>
+                  <a:schemeClr val="tx1"/>
+                </a:solidFill>
+                <a:latin typeface="Calibri" panose="020F0502020204030204" pitchFamily="34" charset="0"/>
+              </a:defRPr>
+            </a:lvl2pPr>
+            <a:lvl3pPr marL="1143000" indent="-228600">
+              <a:defRPr>
+                <a:solidFill>
+                  <a:schemeClr val="tx1"/>
+                </a:solidFill>
+                <a:latin typeface="Calibri" panose="020F0502020204030204" pitchFamily="34" charset="0"/>
+              </a:defRPr>
+            </a:lvl3pPr>
+            <a:lvl4pPr marL="1600200" indent="-228600">
+              <a:defRPr>
+                <a:solidFill>
+                  <a:schemeClr val="tx1"/>
+                </a:solidFill>
+                <a:latin typeface="Calibri" panose="020F0502020204030204" pitchFamily="34" charset="0"/>
+              </a:defRPr>
+            </a:lvl4pPr>
+            <a:lvl5pPr marL="2057400" indent="-228600">
+              <a:defRPr>
+                <a:solidFill>
+                  <a:schemeClr val="tx1"/>
+                </a:solidFill>
+                <a:latin typeface="Calibri" panose="020F0502020204030204" pitchFamily="34" charset="0"/>
+              </a:defRPr>
+            </a:lvl5pPr>
+            <a:lvl6pPr marL="2514600" indent="-228600" eaLnBrk="0" fontAlgn="base" hangingPunct="0">
+              <a:spcBef>
+                <a:spcPct val="0"/>
+              </a:spcBef>
+              <a:spcAft>
+                <a:spcPct val="0"/>
+              </a:spcAft>
+              <a:defRPr>
+                <a:solidFill>
+                  <a:schemeClr val="tx1"/>
+                </a:solidFill>
+                <a:latin typeface="Calibri" panose="020F0502020204030204" pitchFamily="34" charset="0"/>
+              </a:defRPr>
+            </a:lvl6pPr>
+            <a:lvl7pPr marL="2971800" indent="-228600" eaLnBrk="0" fontAlgn="base" hangingPunct="0">
+              <a:spcBef>
+                <a:spcPct val="0"/>
+              </a:spcBef>
+              <a:spcAft>
+                <a:spcPct val="0"/>
+              </a:spcAft>
+              <a:defRPr>
+                <a:solidFill>
+                  <a:schemeClr val="tx1"/>
+                </a:solidFill>
+                <a:latin typeface="Calibri" panose="020F0502020204030204" pitchFamily="34" charset="0"/>
+              </a:defRPr>
+            </a:lvl7pPr>
+            <a:lvl8pPr marL="3429000" indent="-228600" eaLnBrk="0" fontAlgn="base" hangingPunct="0">
+              <a:spcBef>
+                <a:spcPct val="0"/>
+              </a:spcBef>
+              <a:spcAft>
+                <a:spcPct val="0"/>
+              </a:spcAft>
+              <a:defRPr>
+                <a:solidFill>
+                  <a:schemeClr val="tx1"/>
+                </a:solidFill>
+                <a:latin typeface="Calibri" panose="020F0502020204030204" pitchFamily="34" charset="0"/>
+              </a:defRPr>
+            </a:lvl8pPr>
+            <a:lvl9pPr marL="3886200" indent="-228600" eaLnBrk="0" fontAlgn="base" hangingPunct="0">
+              <a:spcBef>
+                <a:spcPct val="0"/>
+              </a:spcBef>
+              <a:spcAft>
+                <a:spcPct val="0"/>
+              </a:spcAft>
+              <a:defRPr>
+                <a:solidFill>
+                  <a:schemeClr val="tx1"/>
+                </a:solidFill>
+                <a:latin typeface="Calibri" panose="020F0502020204030204" pitchFamily="34" charset="0"/>
+              </a:defRPr>
+            </a:lvl9pPr>
+          </a:lstStyle>
+          <a:p>
+            <a:pPr algn="ctr" eaLnBrk="1" hangingPunct="1"/>
+            <a:r>
+              <a:rPr lang="en-US" altLang="en-US" sz="1100" dirty="0">
+                <a:latin typeface="Arial" panose="020B0604020202020204" pitchFamily="34" charset="0"/>
+                <a:ea typeface="Amazon Ember" panose="020B0603020204020204" pitchFamily="34" charset="0"/>
+                <a:cs typeface="Arial" panose="020B0604020202020204" pitchFamily="34" charset="0"/>
+              </a:rPr>
+              <a:t>AWS SFTP</a:t>
+            </a:r>
+          </a:p>
+        </p:txBody>
+      </p:sp>
+      <p:pic>
+        <p:nvPicPr>
+          <p:cNvPr id="19" name="Graphic 22">
+            <a:extLst>
+              <a:ext uri="{FF2B5EF4-FFF2-40B4-BE49-F238E27FC236}">
+                <a16:creationId xmlns:a16="http://schemas.microsoft.com/office/drawing/2014/main" id="{74B723BD-2112-1A4C-7BB3-5CFF47743226}"/>
+              </a:ext>
+            </a:extLst>
+          </p:cNvPr>
+          <p:cNvPicPr>
+            <a:picLocks noChangeAspect="1" noChangeArrowheads="1"/>
+          </p:cNvPicPr>
+          <p:nvPr/>
+        </p:nvPicPr>
+        <p:blipFill>
+          <a:blip r:embed="rId5">
+            <a:extLst>
+              <a:ext uri="{28A0092B-C50C-407E-A947-70E740481C1C}">
+                <a14:useLocalDpi xmlns:a14="http://schemas.microsoft.com/office/drawing/2010/main" val="0"/>
+              </a:ext>
+            </a:extLst>
+          </a:blip>
+          <a:srcRect/>
+          <a:stretch>
+            <a:fillRect/>
+          </a:stretch>
+        </p:blipFill>
+        <p:spPr bwMode="auto">
+          <a:xfrm>
+            <a:off x="6390457" y="4545767"/>
+            <a:ext cx="457200" cy="457200"/>
+          </a:xfrm>
+          <a:prstGeom prst="rect">
+            <a:avLst/>
+          </a:prstGeom>
+          <a:noFill/>
+          <a:ln>
+            <a:noFill/>
+          </a:ln>
+          <a:extLst>
+            <a:ext uri="{909E8E84-426E-40DD-AFC4-6F175D3DCCD1}">
+              <a14:hiddenFill xmlns:a14="http://schemas.microsoft.com/office/drawing/2010/main">
+                <a:solidFill>
+                  <a:srgbClr val="FFFFFF"/>
+                </a:solidFill>
+              </a14:hiddenFill>
+            </a:ext>
+            <a:ext uri="{91240B29-F687-4F45-9708-019B960494DF}">
+              <a14:hiddenLine xmlns:a14="http://schemas.microsoft.com/office/drawing/2010/main" w="9525">
+                <a:solidFill>
+                  <a:srgbClr val="000000"/>
+                </a:solidFill>
+                <a:miter lim="800000"/>
+                <a:headEnd/>
+                <a:tailEnd/>
+              </a14:hiddenLine>
+            </a:ext>
+          </a:extLst>
+        </p:spPr>
+      </p:pic>
+      <p:cxnSp>
+        <p:nvCxnSpPr>
+          <p:cNvPr id="20" name="Straight Arrow Connector 19">
+            <a:extLst>
+              <a:ext uri="{FF2B5EF4-FFF2-40B4-BE49-F238E27FC236}">
+                <a16:creationId xmlns:a16="http://schemas.microsoft.com/office/drawing/2014/main" id="{6952D7F3-5F55-BC94-B064-EFA4F21096D3}"/>
+              </a:ext>
+            </a:extLst>
+          </p:cNvPr>
+          <p:cNvCxnSpPr>
+            <a:cxnSpLocks/>
+            <a:stCxn id="9" idx="2"/>
+            <a:endCxn id="17" idx="0"/>
+          </p:cNvCxnSpPr>
+          <p:nvPr/>
+        </p:nvCxnSpPr>
+        <p:spPr>
+          <a:xfrm>
+            <a:off x="3224289" y="4277754"/>
+            <a:ext cx="0" cy="268013"/>
+          </a:xfrm>
+          <a:prstGeom prst="straightConnector1">
+            <a:avLst/>
+          </a:prstGeom>
+          <a:ln w="12700">
+            <a:solidFill>
+              <a:srgbClr val="545B64"/>
+            </a:solidFill>
+            <a:headEnd type="none" w="med" len="sm"/>
+            <a:tailEnd type="arrow" w="med" len="sm"/>
+          </a:ln>
+        </p:spPr>
+        <p:style>
+          <a:lnRef idx="1">
+            <a:schemeClr val="accent1"/>
+          </a:lnRef>
+          <a:fillRef idx="0">
+            <a:schemeClr val="accent1"/>
+          </a:fillRef>
+          <a:effectRef idx="0">
+            <a:schemeClr val="accent1"/>
+          </a:effectRef>
+          <a:fontRef idx="minor">
+            <a:schemeClr val="tx1"/>
+          </a:fontRef>
+        </p:style>
+      </p:cxnSp>
+      <p:sp>
+        <p:nvSpPr>
+          <p:cNvPr id="30" name="TextBox 29">
+            <a:extLst>
+              <a:ext uri="{FF2B5EF4-FFF2-40B4-BE49-F238E27FC236}">
+                <a16:creationId xmlns:a16="http://schemas.microsoft.com/office/drawing/2014/main" id="{D2288A63-BD10-6B9E-599C-140BB47595BF}"/>
+              </a:ext>
+            </a:extLst>
+          </p:cNvPr>
+          <p:cNvSpPr txBox="1">
+            <a:spLocks noChangeArrowheads="1"/>
+          </p:cNvSpPr>
+          <p:nvPr/>
+        </p:nvSpPr>
+        <p:spPr bwMode="auto">
+          <a:xfrm>
+            <a:off x="4293939" y="5027297"/>
+            <a:ext cx="1290638" cy="261610"/>
+          </a:xfrm>
+          <a:prstGeom prst="rect">
+            <a:avLst/>
+          </a:prstGeom>
+          <a:noFill/>
+          <a:ln>
+            <a:noFill/>
+          </a:ln>
+          <a:extLst>
+            <a:ext uri="{909E8E84-426E-40DD-AFC4-6F175D3DCCD1}">
+              <a14:hiddenFill xmlns:a14="http://schemas.microsoft.com/office/drawing/2010/main">
+                <a:solidFill>
+                  <a:srgbClr val="FFFFFF"/>
+                </a:solidFill>
+              </a14:hiddenFill>
+            </a:ext>
+            <a:ext uri="{91240B29-F687-4F45-9708-019B960494DF}">
+              <a14:hiddenLine xmlns:a14="http://schemas.microsoft.com/office/drawing/2010/main" w="9525">
+                <a:solidFill>
+                  <a:srgbClr val="000000"/>
+                </a:solidFill>
+                <a:miter lim="800000"/>
+                <a:headEnd/>
+                <a:tailEnd/>
+              </a14:hiddenLine>
+            </a:ext>
+          </a:extLst>
+        </p:spPr>
+        <p:txBody>
+          <a:bodyPr wrap="square">
+            <a:spAutoFit/>
+          </a:bodyPr>
+          <a:lstStyle>
+            <a:lvl1pPr>
+              <a:defRPr>
+                <a:solidFill>
+                  <a:schemeClr val="tx1"/>
+                </a:solidFill>
+                <a:latin typeface="Calibri" panose="020F0502020204030204" pitchFamily="34" charset="0"/>
+              </a:defRPr>
+            </a:lvl1pPr>
+            <a:lvl2pPr marL="742950" indent="-285750">
+              <a:defRPr>
+                <a:solidFill>
+                  <a:schemeClr val="tx1"/>
+                </a:solidFill>
+                <a:latin typeface="Calibri" panose="020F0502020204030204" pitchFamily="34" charset="0"/>
+              </a:defRPr>
+            </a:lvl2pPr>
+            <a:lvl3pPr marL="1143000" indent="-228600">
+              <a:defRPr>
+                <a:solidFill>
+                  <a:schemeClr val="tx1"/>
+                </a:solidFill>
+                <a:latin typeface="Calibri" panose="020F0502020204030204" pitchFamily="34" charset="0"/>
+              </a:defRPr>
+            </a:lvl3pPr>
+            <a:lvl4pPr marL="1600200" indent="-228600">
+              <a:defRPr>
+                <a:solidFill>
+                  <a:schemeClr val="tx1"/>
+                </a:solidFill>
+                <a:latin typeface="Calibri" panose="020F0502020204030204" pitchFamily="34" charset="0"/>
+              </a:defRPr>
+            </a:lvl4pPr>
+            <a:lvl5pPr marL="2057400" indent="-228600">
+              <a:defRPr>
+                <a:solidFill>
+                  <a:schemeClr val="tx1"/>
+                </a:solidFill>
+                <a:latin typeface="Calibri" panose="020F0502020204030204" pitchFamily="34" charset="0"/>
+              </a:defRPr>
+            </a:lvl5pPr>
+            <a:lvl6pPr marL="2514600" indent="-228600" eaLnBrk="0" fontAlgn="base" hangingPunct="0">
+              <a:spcBef>
+                <a:spcPct val="0"/>
+              </a:spcBef>
+              <a:spcAft>
+                <a:spcPct val="0"/>
+              </a:spcAft>
+              <a:defRPr>
+                <a:solidFill>
+                  <a:schemeClr val="tx1"/>
+                </a:solidFill>
+                <a:latin typeface="Calibri" panose="020F0502020204030204" pitchFamily="34" charset="0"/>
+              </a:defRPr>
+            </a:lvl6pPr>
+            <a:lvl7pPr marL="2971800" indent="-228600" eaLnBrk="0" fontAlgn="base" hangingPunct="0">
+              <a:spcBef>
+                <a:spcPct val="0"/>
+              </a:spcBef>
+              <a:spcAft>
+                <a:spcPct val="0"/>
+              </a:spcAft>
+              <a:defRPr>
+                <a:solidFill>
+                  <a:schemeClr val="tx1"/>
+                </a:solidFill>
+                <a:latin typeface="Calibri" panose="020F0502020204030204" pitchFamily="34" charset="0"/>
+              </a:defRPr>
+            </a:lvl7pPr>
+            <a:lvl8pPr marL="3429000" indent="-228600" eaLnBrk="0" fontAlgn="base" hangingPunct="0">
+              <a:spcBef>
+                <a:spcPct val="0"/>
+              </a:spcBef>
+              <a:spcAft>
+                <a:spcPct val="0"/>
+              </a:spcAft>
+              <a:defRPr>
+                <a:solidFill>
+                  <a:schemeClr val="tx1"/>
+                </a:solidFill>
+                <a:latin typeface="Calibri" panose="020F0502020204030204" pitchFamily="34" charset="0"/>
+              </a:defRPr>
+            </a:lvl8pPr>
+            <a:lvl9pPr marL="3886200" indent="-228600" eaLnBrk="0" fontAlgn="base" hangingPunct="0">
+              <a:spcBef>
+                <a:spcPct val="0"/>
+              </a:spcBef>
+              <a:spcAft>
+                <a:spcPct val="0"/>
+              </a:spcAft>
+              <a:defRPr>
+                <a:solidFill>
+                  <a:schemeClr val="tx1"/>
+                </a:solidFill>
+                <a:latin typeface="Calibri" panose="020F0502020204030204" pitchFamily="34" charset="0"/>
+              </a:defRPr>
+            </a:lvl9pPr>
+          </a:lstStyle>
+          <a:p>
+            <a:pPr algn="ctr" eaLnBrk="1" hangingPunct="1"/>
+            <a:r>
+              <a:rPr lang="en-US" altLang="en-US" sz="1100" dirty="0">
+                <a:latin typeface="Arial" panose="020B0604020202020204" pitchFamily="34" charset="0"/>
+                <a:ea typeface="Amazon Ember" panose="020B0603020204020204" pitchFamily="34" charset="0"/>
+                <a:cs typeface="Arial" panose="020B0604020202020204" pitchFamily="34" charset="0"/>
+              </a:rPr>
+              <a:t>S3 bucket</a:t>
+            </a:r>
+          </a:p>
+        </p:txBody>
+      </p:sp>
+      <p:pic>
+        <p:nvPicPr>
+          <p:cNvPr id="31" name="Graphic 31">
+            <a:extLst>
+              <a:ext uri="{FF2B5EF4-FFF2-40B4-BE49-F238E27FC236}">
+                <a16:creationId xmlns:a16="http://schemas.microsoft.com/office/drawing/2014/main" id="{143358EA-7AB1-9BF7-42D8-BEF482B47EAD}"/>
+              </a:ext>
+            </a:extLst>
+          </p:cNvPr>
+          <p:cNvPicPr>
+            <a:picLocks noChangeAspect="1" noChangeArrowheads="1"/>
+          </p:cNvPicPr>
+          <p:nvPr/>
+        </p:nvPicPr>
+        <p:blipFill>
+          <a:blip r:embed="rId6">
+            <a:extLst>
+              <a:ext uri="{28A0092B-C50C-407E-A947-70E740481C1C}">
+                <a14:useLocalDpi xmlns:a14="http://schemas.microsoft.com/office/drawing/2010/main" val="0"/>
+              </a:ext>
+            </a:extLst>
+          </a:blip>
+          <a:srcRect/>
+          <a:stretch>
+            <a:fillRect/>
+          </a:stretch>
+        </p:blipFill>
+        <p:spPr bwMode="auto">
+          <a:xfrm>
+            <a:off x="4710658" y="4545767"/>
+            <a:ext cx="457200" cy="457200"/>
+          </a:xfrm>
+          <a:prstGeom prst="rect">
+            <a:avLst/>
+          </a:prstGeom>
+          <a:noFill/>
+          <a:ln>
+            <a:noFill/>
+          </a:ln>
+          <a:extLst>
+            <a:ext uri="{909E8E84-426E-40DD-AFC4-6F175D3DCCD1}">
+              <a14:hiddenFill xmlns:a14="http://schemas.microsoft.com/office/drawing/2010/main">
+                <a:solidFill>
+                  <a:srgbClr val="FFFFFF"/>
+                </a:solidFill>
+              </a14:hiddenFill>
+            </a:ext>
+            <a:ext uri="{91240B29-F687-4F45-9708-019B960494DF}">
+              <a14:hiddenLine xmlns:a14="http://schemas.microsoft.com/office/drawing/2010/main" w="9525">
+                <a:solidFill>
+                  <a:srgbClr val="000000"/>
+                </a:solidFill>
+                <a:miter lim="800000"/>
+                <a:headEnd/>
+                <a:tailEnd/>
+              </a14:hiddenLine>
+            </a:ext>
+          </a:extLst>
+        </p:spPr>
+      </p:pic>
+      <p:cxnSp>
+        <p:nvCxnSpPr>
+          <p:cNvPr id="32" name="Straight Arrow Connector 31">
+            <a:extLst>
+              <a:ext uri="{FF2B5EF4-FFF2-40B4-BE49-F238E27FC236}">
+                <a16:creationId xmlns:a16="http://schemas.microsoft.com/office/drawing/2014/main" id="{DF2BECDD-FC4F-21DC-3249-75E287F304B6}"/>
+              </a:ext>
+            </a:extLst>
+          </p:cNvPr>
+          <p:cNvCxnSpPr>
+            <a:cxnSpLocks/>
+            <a:stCxn id="17" idx="3"/>
+            <a:endCxn id="31" idx="1"/>
+          </p:cNvCxnSpPr>
+          <p:nvPr/>
+        </p:nvCxnSpPr>
+        <p:spPr>
+          <a:xfrm>
+            <a:off x="3452889" y="4774367"/>
+            <a:ext cx="1257769" cy="0"/>
+          </a:xfrm>
+          <a:prstGeom prst="straightConnector1">
+            <a:avLst/>
+          </a:prstGeom>
+          <a:ln w="12700">
+            <a:solidFill>
+              <a:srgbClr val="545B64"/>
+            </a:solidFill>
+            <a:headEnd type="none" w="med" len="sm"/>
+            <a:tailEnd type="arrow" w="med" len="sm"/>
+          </a:ln>
+        </p:spPr>
+        <p:style>
+          <a:lnRef idx="1">
+            <a:schemeClr val="accent1"/>
+          </a:lnRef>
+          <a:fillRef idx="0">
+            <a:schemeClr val="accent1"/>
+          </a:fillRef>
+          <a:effectRef idx="0">
+            <a:schemeClr val="accent1"/>
+          </a:effectRef>
+          <a:fontRef idx="minor">
+            <a:schemeClr val="tx1"/>
+          </a:fontRef>
+        </p:style>
+      </p:cxnSp>
+      <p:sp>
+        <p:nvSpPr>
+          <p:cNvPr id="35" name="Rectangle 34">
+            <a:extLst>
+              <a:ext uri="{FF2B5EF4-FFF2-40B4-BE49-F238E27FC236}">
+                <a16:creationId xmlns:a16="http://schemas.microsoft.com/office/drawing/2014/main" id="{0F335BAE-D100-C3E7-1879-67DB04B2531F}"/>
+              </a:ext>
+            </a:extLst>
+          </p:cNvPr>
+          <p:cNvSpPr/>
+          <p:nvPr/>
+        </p:nvSpPr>
+        <p:spPr>
+          <a:xfrm>
+            <a:off x="2253104" y="1434654"/>
+            <a:ext cx="1950731" cy="4144343"/>
+          </a:xfrm>
+          <a:prstGeom prst="rect">
+            <a:avLst/>
+          </a:prstGeom>
+          <a:noFill/>
+          <a:ln w="12700">
+            <a:solidFill>
+              <a:srgbClr val="5B9CD5"/>
+            </a:solidFill>
+            <a:prstDash val="dash"/>
+          </a:ln>
+        </p:spPr>
+        <p:style>
+          <a:lnRef idx="2">
+            <a:schemeClr val="accent1">
+              <a:shade val="50000"/>
+            </a:schemeClr>
+          </a:lnRef>
+          <a:fillRef idx="1">
+            <a:schemeClr val="accent1"/>
+          </a:fillRef>
+          <a:effectRef idx="0">
+            <a:schemeClr val="accent1"/>
+          </a:effectRef>
+          <a:fontRef idx="minor">
+            <a:schemeClr val="lt1"/>
+          </a:fontRef>
+        </p:style>
+        <p:txBody>
+          <a:bodyPr tIns="91440"/>
+          <a:lstStyle/>
+          <a:p>
+            <a:pPr algn="ctr" eaLnBrk="1" fontAlgn="auto" hangingPunct="1">
+              <a:spcBef>
+                <a:spcPts val="0"/>
+              </a:spcBef>
+              <a:spcAft>
+                <a:spcPts val="0"/>
+              </a:spcAft>
+              <a:defRPr/>
+            </a:pPr>
+            <a:r>
+              <a:rPr lang="en-US" sz="1200" dirty="0">
+                <a:solidFill>
+                  <a:srgbClr val="5B9CD5"/>
+                </a:solidFill>
+                <a:latin typeface="Arial" panose="020B0604020202020204" pitchFamily="34" charset="0"/>
+                <a:cs typeface="Arial" panose="020B0604020202020204" pitchFamily="34" charset="0"/>
+              </a:rPr>
+              <a:t>Availability Zone 1</a:t>
+            </a:r>
+          </a:p>
+        </p:txBody>
+      </p:sp>
+      <p:sp>
+        <p:nvSpPr>
+          <p:cNvPr id="36" name="Rectangle 35">
+            <a:extLst>
+              <a:ext uri="{FF2B5EF4-FFF2-40B4-BE49-F238E27FC236}">
+                <a16:creationId xmlns:a16="http://schemas.microsoft.com/office/drawing/2014/main" id="{E88B52C9-3548-53AB-C043-DE8ACD4C6065}"/>
+              </a:ext>
+            </a:extLst>
+          </p:cNvPr>
+          <p:cNvSpPr/>
+          <p:nvPr/>
+        </p:nvSpPr>
+        <p:spPr>
+          <a:xfrm>
+            <a:off x="5647657" y="1434654"/>
+            <a:ext cx="1950731" cy="4144343"/>
+          </a:xfrm>
+          <a:prstGeom prst="rect">
+            <a:avLst/>
+          </a:prstGeom>
+          <a:noFill/>
+          <a:ln w="12700">
+            <a:solidFill>
+              <a:srgbClr val="5B9CD5"/>
+            </a:solidFill>
+            <a:prstDash val="dash"/>
+          </a:ln>
+        </p:spPr>
+        <p:style>
+          <a:lnRef idx="2">
+            <a:schemeClr val="accent1">
+              <a:shade val="50000"/>
+            </a:schemeClr>
+          </a:lnRef>
+          <a:fillRef idx="1">
+            <a:schemeClr val="accent1"/>
+          </a:fillRef>
+          <a:effectRef idx="0">
+            <a:schemeClr val="accent1"/>
+          </a:effectRef>
+          <a:fontRef idx="minor">
+            <a:schemeClr val="lt1"/>
+          </a:fontRef>
+        </p:style>
+        <p:txBody>
+          <a:bodyPr tIns="91440"/>
+          <a:lstStyle/>
+          <a:p>
+            <a:pPr algn="ctr" eaLnBrk="1" fontAlgn="auto" hangingPunct="1">
+              <a:spcBef>
+                <a:spcPts val="0"/>
+              </a:spcBef>
+              <a:spcAft>
+                <a:spcPts val="0"/>
+              </a:spcAft>
+              <a:defRPr/>
+            </a:pPr>
+            <a:r>
+              <a:rPr lang="en-US" sz="1200" dirty="0">
+                <a:solidFill>
+                  <a:srgbClr val="5B9CD5"/>
+                </a:solidFill>
+                <a:latin typeface="Arial" panose="020B0604020202020204" pitchFamily="34" charset="0"/>
+                <a:cs typeface="Arial" panose="020B0604020202020204" pitchFamily="34" charset="0"/>
+              </a:rPr>
+              <a:t>Availability Zone 2</a:t>
+            </a:r>
+          </a:p>
+        </p:txBody>
+      </p:sp>
+      <p:cxnSp>
+        <p:nvCxnSpPr>
+          <p:cNvPr id="38" name="Straight Arrow Connector 37">
+            <a:extLst>
+              <a:ext uri="{FF2B5EF4-FFF2-40B4-BE49-F238E27FC236}">
+                <a16:creationId xmlns:a16="http://schemas.microsoft.com/office/drawing/2014/main" id="{31416E74-AE94-A186-552E-BCC59E4EC374}"/>
+              </a:ext>
+            </a:extLst>
+          </p:cNvPr>
+          <p:cNvCxnSpPr>
+            <a:cxnSpLocks/>
+            <a:stCxn id="19" idx="1"/>
+            <a:endCxn id="31" idx="3"/>
+          </p:cNvCxnSpPr>
+          <p:nvPr/>
+        </p:nvCxnSpPr>
+        <p:spPr>
+          <a:xfrm flipH="1">
+            <a:off x="5167858" y="4774367"/>
+            <a:ext cx="1222599" cy="0"/>
+          </a:xfrm>
+          <a:prstGeom prst="straightConnector1">
+            <a:avLst/>
+          </a:prstGeom>
+          <a:ln w="12700">
+            <a:solidFill>
+              <a:srgbClr val="545B64"/>
+            </a:solidFill>
+            <a:headEnd type="none" w="med" len="sm"/>
+            <a:tailEnd type="arrow" w="med" len="sm"/>
+          </a:ln>
+        </p:spPr>
+        <p:style>
+          <a:lnRef idx="1">
+            <a:schemeClr val="accent1"/>
+          </a:lnRef>
+          <a:fillRef idx="0">
+            <a:schemeClr val="accent1"/>
+          </a:fillRef>
+          <a:effectRef idx="0">
+            <a:schemeClr val="accent1"/>
+          </a:effectRef>
+          <a:fontRef idx="minor">
+            <a:schemeClr val="tx1"/>
+          </a:fontRef>
+        </p:style>
+      </p:cxnSp>
+      <p:sp>
+        <p:nvSpPr>
+          <p:cNvPr id="41" name="Rectangle 40">
+            <a:extLst>
+              <a:ext uri="{FF2B5EF4-FFF2-40B4-BE49-F238E27FC236}">
+                <a16:creationId xmlns:a16="http://schemas.microsoft.com/office/drawing/2014/main" id="{7F511EC5-406D-1D4D-3D81-211A5AF7E7A1}"/>
+              </a:ext>
+            </a:extLst>
+          </p:cNvPr>
+          <p:cNvSpPr/>
+          <p:nvPr/>
+        </p:nvSpPr>
+        <p:spPr>
+          <a:xfrm>
+            <a:off x="1805669" y="1778743"/>
+            <a:ext cx="5960944" cy="3644603"/>
+          </a:xfrm>
+          <a:prstGeom prst="rect">
+            <a:avLst/>
+          </a:prstGeom>
+          <a:noFill/>
+          <a:ln w="12700">
+            <a:solidFill>
+              <a:srgbClr val="1E8900"/>
+            </a:solidFill>
+          </a:ln>
+        </p:spPr>
+        <p:style>
+          <a:lnRef idx="2">
+            <a:schemeClr val="accent1">
+              <a:shade val="50000"/>
+            </a:schemeClr>
+          </a:lnRef>
+          <a:fillRef idx="1">
+            <a:schemeClr val="accent1"/>
+          </a:fillRef>
+          <a:effectRef idx="0">
+            <a:schemeClr val="accent1"/>
+          </a:effectRef>
+          <a:fontRef idx="minor">
+            <a:schemeClr val="lt1"/>
+          </a:fontRef>
+        </p:style>
+        <p:txBody>
+          <a:bodyPr lIns="502920" tIns="91440"/>
+          <a:lstStyle/>
+          <a:p>
+            <a:pPr eaLnBrk="1" fontAlgn="auto" hangingPunct="1">
+              <a:spcBef>
+                <a:spcPts val="0"/>
+              </a:spcBef>
+              <a:spcAft>
+                <a:spcPts val="0"/>
+              </a:spcAft>
+              <a:defRPr/>
+            </a:pPr>
+            <a:r>
+              <a:rPr lang="en-US" sz="1200" dirty="0">
+                <a:ln w="0"/>
+                <a:solidFill>
+                  <a:srgbClr val="1E8900"/>
+                </a:solidFill>
+                <a:latin typeface="Arial" panose="020B0604020202020204" pitchFamily="34" charset="0"/>
+                <a:cs typeface="Arial" panose="020B0604020202020204" pitchFamily="34" charset="0"/>
+              </a:rPr>
+              <a:t>VPC</a:t>
+            </a:r>
+          </a:p>
+        </p:txBody>
+      </p:sp>
+      <p:pic>
+        <p:nvPicPr>
+          <p:cNvPr id="42" name="Graphic 41">
+            <a:extLst>
+              <a:ext uri="{FF2B5EF4-FFF2-40B4-BE49-F238E27FC236}">
+                <a16:creationId xmlns:a16="http://schemas.microsoft.com/office/drawing/2014/main" id="{AE63F127-B619-2716-CD7A-904FE2D5956E}"/>
+              </a:ext>
+            </a:extLst>
+          </p:cNvPr>
+          <p:cNvPicPr>
+            <a:picLocks noChangeAspect="1"/>
+          </p:cNvPicPr>
+          <p:nvPr/>
+        </p:nvPicPr>
+        <p:blipFill>
+          <a:blip r:embed="rId7">
+            <a:extLst>
+              <a:ext uri="{96DAC541-7B7A-43D3-8B79-37D633B846F1}">
+                <asvg:svgBlip xmlns:asvg="http://schemas.microsoft.com/office/drawing/2016/SVG/main" r:embed="rId8"/>
+              </a:ext>
+            </a:extLst>
+          </a:blip>
+          <a:stretch>
+            <a:fillRect/>
+          </a:stretch>
+        </p:blipFill>
+        <p:spPr>
+          <a:xfrm>
+            <a:off x="1805670" y="1780332"/>
+            <a:ext cx="381000" cy="381000"/>
+          </a:xfrm>
+          <a:prstGeom prst="rect">
+            <a:avLst/>
+          </a:prstGeom>
+        </p:spPr>
+      </p:pic>
+      <p:sp>
+        <p:nvSpPr>
+          <p:cNvPr id="43" name="Rectangle 42">
+            <a:extLst>
+              <a:ext uri="{FF2B5EF4-FFF2-40B4-BE49-F238E27FC236}">
+                <a16:creationId xmlns:a16="http://schemas.microsoft.com/office/drawing/2014/main" id="{D1B7C1D8-C6E2-BDC9-CFF6-BAC4B0D55DB1}"/>
+              </a:ext>
+            </a:extLst>
+          </p:cNvPr>
+          <p:cNvSpPr/>
+          <p:nvPr/>
+        </p:nvSpPr>
+        <p:spPr>
+          <a:xfrm>
+            <a:off x="1654702" y="1051510"/>
+            <a:ext cx="6273956" cy="4666384"/>
+          </a:xfrm>
+          <a:prstGeom prst="rect">
+            <a:avLst/>
+          </a:prstGeom>
+          <a:noFill/>
+          <a:ln w="12700">
+            <a:solidFill>
+              <a:schemeClr val="tx1"/>
+            </a:solidFill>
+          </a:ln>
+        </p:spPr>
+        <p:style>
+          <a:lnRef idx="2">
+            <a:schemeClr val="accent1">
+              <a:shade val="50000"/>
+            </a:schemeClr>
+          </a:lnRef>
+          <a:fillRef idx="1">
+            <a:schemeClr val="accent1"/>
+          </a:fillRef>
+          <a:effectRef idx="0">
+            <a:schemeClr val="accent1"/>
+          </a:effectRef>
+          <a:fontRef idx="minor">
+            <a:schemeClr val="lt1"/>
+          </a:fontRef>
+        </p:style>
+        <p:txBody>
+          <a:bodyPr lIns="502920" tIns="91440"/>
+          <a:lstStyle/>
+          <a:p>
+            <a:pPr eaLnBrk="1" fontAlgn="auto" hangingPunct="1">
+              <a:spcBef>
+                <a:spcPts val="0"/>
+              </a:spcBef>
+              <a:spcAft>
+                <a:spcPts val="0"/>
+              </a:spcAft>
+              <a:defRPr/>
+            </a:pPr>
+            <a:r>
+              <a:rPr lang="en-US" sz="1200" dirty="0">
+                <a:solidFill>
+                  <a:sysClr val="windowText" lastClr="000000"/>
+                </a:solidFill>
+                <a:latin typeface="Arial" panose="020B0604020202020204" pitchFamily="34" charset="0"/>
+                <a:cs typeface="Arial" panose="020B0604020202020204" pitchFamily="34" charset="0"/>
+              </a:rPr>
+              <a:t>AWS Cloud</a:t>
+            </a:r>
+          </a:p>
+        </p:txBody>
+      </p:sp>
+      <p:pic>
+        <p:nvPicPr>
+          <p:cNvPr id="44" name="Graphic 43">
+            <a:extLst>
+              <a:ext uri="{FF2B5EF4-FFF2-40B4-BE49-F238E27FC236}">
+                <a16:creationId xmlns:a16="http://schemas.microsoft.com/office/drawing/2014/main" id="{7CD7B33F-BFE8-B56E-93AD-30AED13DC6A3}"/>
+              </a:ext>
+            </a:extLst>
+          </p:cNvPr>
+          <p:cNvPicPr>
+            <a:picLocks noChangeAspect="1"/>
+          </p:cNvPicPr>
+          <p:nvPr/>
+        </p:nvPicPr>
+        <p:blipFill>
+          <a:blip r:embed="rId9">
+            <a:extLst>
+              <a:ext uri="{96DAC541-7B7A-43D3-8B79-37D633B846F1}">
+                <asvg:svgBlip xmlns:asvg="http://schemas.microsoft.com/office/drawing/2016/SVG/main" r:embed="rId10"/>
+              </a:ext>
+            </a:extLst>
+          </a:blip>
+          <a:srcRect/>
+          <a:stretch/>
+        </p:blipFill>
+        <p:spPr>
+          <a:xfrm>
+            <a:off x="1654701" y="1051510"/>
+            <a:ext cx="381000" cy="381000"/>
+          </a:xfrm>
+          <a:prstGeom prst="rect">
+            <a:avLst/>
+          </a:prstGeom>
+        </p:spPr>
+      </p:pic>
+      <p:pic>
+        <p:nvPicPr>
+          <p:cNvPr id="40" name="Graphic 60">
+            <a:extLst>
+              <a:ext uri="{FF2B5EF4-FFF2-40B4-BE49-F238E27FC236}">
+                <a16:creationId xmlns:a16="http://schemas.microsoft.com/office/drawing/2014/main" id="{57E15CBE-0B02-E07C-EC9E-34D62442395C}"/>
+              </a:ext>
+            </a:extLst>
+          </p:cNvPr>
+          <p:cNvPicPr>
+            <a:picLocks noChangeAspect="1" noChangeArrowheads="1"/>
+          </p:cNvPicPr>
+          <p:nvPr/>
+        </p:nvPicPr>
+        <p:blipFill>
+          <a:blip r:embed="rId11">
+            <a:extLst>
+              <a:ext uri="{28A0092B-C50C-407E-A947-70E740481C1C}">
+                <a14:useLocalDpi xmlns:a14="http://schemas.microsoft.com/office/drawing/2010/main" val="0"/>
+              </a:ext>
+            </a:extLst>
+          </a:blip>
+          <a:srcRect/>
+          <a:stretch>
+            <a:fillRect/>
+          </a:stretch>
+        </p:blipFill>
+        <p:spPr bwMode="auto">
+          <a:xfrm>
+            <a:off x="2995689" y="3374203"/>
+            <a:ext cx="457200" cy="457200"/>
+          </a:xfrm>
+          <a:prstGeom prst="rect">
+            <a:avLst/>
+          </a:prstGeom>
+          <a:noFill/>
+          <a:ln>
+            <a:noFill/>
+          </a:ln>
+          <a:extLst>
+            <a:ext uri="{909E8E84-426E-40DD-AFC4-6F175D3DCCD1}">
+              <a14:hiddenFill xmlns:a14="http://schemas.microsoft.com/office/drawing/2010/main">
+                <a:solidFill>
+                  <a:srgbClr val="FFFFFF"/>
+                </a:solidFill>
+              </a14:hiddenFill>
+            </a:ext>
+            <a:ext uri="{91240B29-F687-4F45-9708-019B960494DF}">
+              <a14:hiddenLine xmlns:a14="http://schemas.microsoft.com/office/drawing/2010/main" w="9525">
+                <a:solidFill>
+                  <a:srgbClr val="000000"/>
+                </a:solidFill>
+                <a:miter lim="800000"/>
+                <a:headEnd/>
+                <a:tailEnd/>
+              </a14:hiddenLine>
+            </a:ext>
+          </a:extLst>
+        </p:spPr>
+      </p:pic>
+      <p:sp>
+        <p:nvSpPr>
+          <p:cNvPr id="47" name="Rectangle 46">
+            <a:extLst>
+              <a:ext uri="{FF2B5EF4-FFF2-40B4-BE49-F238E27FC236}">
+                <a16:creationId xmlns:a16="http://schemas.microsoft.com/office/drawing/2014/main" id="{088DB0F5-7076-ABD5-4359-A8A8CD019B2F}"/>
+              </a:ext>
+            </a:extLst>
+          </p:cNvPr>
+          <p:cNvSpPr/>
+          <p:nvPr/>
+        </p:nvSpPr>
+        <p:spPr>
+          <a:xfrm>
+            <a:off x="2586166" y="3232641"/>
+            <a:ext cx="4717466" cy="1095512"/>
+          </a:xfrm>
+          <a:prstGeom prst="rect">
+            <a:avLst/>
+          </a:prstGeom>
+          <a:noFill/>
+          <a:ln w="12700">
+            <a:solidFill>
+              <a:srgbClr val="D86613"/>
+            </a:solidFill>
+            <a:prstDash val="dash"/>
+          </a:ln>
+        </p:spPr>
+        <p:style>
+          <a:lnRef idx="2">
+            <a:schemeClr val="accent1">
+              <a:shade val="50000"/>
+            </a:schemeClr>
+          </a:lnRef>
+          <a:fillRef idx="1">
+            <a:schemeClr val="accent1"/>
+          </a:fillRef>
+          <a:effectRef idx="0">
+            <a:schemeClr val="accent1"/>
+          </a:effectRef>
+          <a:fontRef idx="minor">
+            <a:schemeClr val="lt1"/>
+          </a:fontRef>
+        </p:style>
+        <p:txBody>
+          <a:bodyPr tIns="91440"/>
+          <a:lstStyle/>
+          <a:p>
+            <a:pPr algn="ctr" eaLnBrk="1" fontAlgn="auto" hangingPunct="1">
+              <a:spcBef>
+                <a:spcPts val="0"/>
+              </a:spcBef>
+              <a:spcAft>
+                <a:spcPts val="0"/>
+              </a:spcAft>
+              <a:defRPr/>
+            </a:pPr>
+            <a:endParaRPr lang="en-US" sz="1200" dirty="0">
+              <a:solidFill>
+                <a:srgbClr val="D86613"/>
+              </a:solidFill>
+              <a:latin typeface="Arial" panose="020B0604020202020204" pitchFamily="34" charset="0"/>
+              <a:cs typeface="Arial" panose="020B0604020202020204" pitchFamily="34" charset="0"/>
+            </a:endParaRPr>
+          </a:p>
+          <a:p>
+            <a:pPr algn="ctr" eaLnBrk="1" fontAlgn="auto" hangingPunct="1">
+              <a:spcBef>
+                <a:spcPts val="0"/>
+              </a:spcBef>
+              <a:spcAft>
+                <a:spcPts val="0"/>
+              </a:spcAft>
+              <a:defRPr/>
+            </a:pPr>
+            <a:endParaRPr lang="en-US" sz="1200" dirty="0">
+              <a:solidFill>
+                <a:srgbClr val="D86613"/>
+              </a:solidFill>
+              <a:latin typeface="Arial" panose="020B0604020202020204" pitchFamily="34" charset="0"/>
+              <a:cs typeface="Arial" panose="020B0604020202020204" pitchFamily="34" charset="0"/>
+            </a:endParaRPr>
+          </a:p>
+          <a:p>
+            <a:pPr algn="ctr" eaLnBrk="1" fontAlgn="auto" hangingPunct="1">
+              <a:spcBef>
+                <a:spcPts val="0"/>
+              </a:spcBef>
+              <a:spcAft>
+                <a:spcPts val="0"/>
+              </a:spcAft>
+              <a:defRPr/>
+            </a:pPr>
+            <a:r>
+              <a:rPr lang="en-US" sz="1200" dirty="0">
+                <a:solidFill>
+                  <a:srgbClr val="D86613"/>
+                </a:solidFill>
+                <a:latin typeface="Arial" panose="020B0604020202020204" pitchFamily="34" charset="0"/>
+                <a:cs typeface="Arial" panose="020B0604020202020204" pitchFamily="34" charset="0"/>
+              </a:rPr>
+              <a:t>Auto Scaling group</a:t>
+            </a:r>
+          </a:p>
+        </p:txBody>
+      </p:sp>
+      <p:pic>
+        <p:nvPicPr>
+          <p:cNvPr id="48" name="Graphic 47">
+            <a:extLst>
+              <a:ext uri="{FF2B5EF4-FFF2-40B4-BE49-F238E27FC236}">
+                <a16:creationId xmlns:a16="http://schemas.microsoft.com/office/drawing/2014/main" id="{1AD27027-DD4A-BA40-ECB3-B5F3D4CFE14E}"/>
+              </a:ext>
+            </a:extLst>
+          </p:cNvPr>
+          <p:cNvPicPr>
+            <a:picLocks noChangeAspect="1"/>
+          </p:cNvPicPr>
+          <p:nvPr/>
+        </p:nvPicPr>
+        <p:blipFill>
+          <a:blip r:embed="rId12">
+            <a:extLst>
+              <a:ext uri="{96DAC541-7B7A-43D3-8B79-37D633B846F1}">
+                <asvg:svgBlip xmlns:asvg="http://schemas.microsoft.com/office/drawing/2016/SVG/main" r:embed="rId13"/>
+              </a:ext>
+            </a:extLst>
+          </a:blip>
+          <a:stretch>
+            <a:fillRect/>
+          </a:stretch>
+        </p:blipFill>
+        <p:spPr>
+          <a:xfrm>
+            <a:off x="4748758" y="3232641"/>
+            <a:ext cx="381000" cy="381000"/>
+          </a:xfrm>
+          <a:prstGeom prst="rect">
+            <a:avLst/>
+          </a:prstGeom>
+        </p:spPr>
+      </p:pic>
+    </p:spTree>
+    <p:extLst>
+      <p:ext uri="{BB962C8B-B14F-4D97-AF65-F5344CB8AC3E}">
+        <p14:creationId xmlns:p14="http://schemas.microsoft.com/office/powerpoint/2010/main" val="3847243676"/>
+      </p:ext>
+    </p:extLst>
+  </p:cSld>
+  <p:clrMapOvr>
+    <a:masterClrMapping/>
+  </p:clrMapOvr>
+</p:sld>
+</file>
+
+<file path=ppt/slides/slide2.xml><?xml version="1.0" encoding="utf-8"?>
+<p:sld xmlns:a="http://schemas.openxmlformats.org/drawingml/2006/main" xmlns:r="http://schemas.openxmlformats.org/officeDocument/2006/relationships" xmlns:p="http://schemas.openxmlformats.org/presentationml/2006/main">
+  <p:cSld>
+    <p:spTree>
+      <p:nvGrpSpPr>
+        <p:cNvPr id="1" name=""/>
+        <p:cNvGrpSpPr/>
+        <p:nvPr/>
+      </p:nvGrpSpPr>
+      <p:grpSpPr>
+        <a:xfrm>
+          <a:off x="0" y="0"/>
+          <a:ext cx="0" cy="0"/>
+          <a:chOff x="0" y="0"/>
+          <a:chExt cx="0" cy="0"/>
+        </a:xfrm>
+      </p:grpSpPr>
+      <p:sp>
+        <p:nvSpPr>
+          <p:cNvPr id="4" name="Rectangle 3">
+            <a:extLst>
+              <a:ext uri="{FF2B5EF4-FFF2-40B4-BE49-F238E27FC236}">
+                <a16:creationId xmlns:a16="http://schemas.microsoft.com/office/drawing/2014/main" id="{3D8796C7-BEA8-576A-BCCD-6A02F713DB60}"/>
+              </a:ext>
+            </a:extLst>
+          </p:cNvPr>
+          <p:cNvSpPr/>
+          <p:nvPr/>
+        </p:nvSpPr>
+        <p:spPr>
+          <a:xfrm>
             <a:off x="2992895" y="2019933"/>
             <a:ext cx="1691005" cy="3049778"/>
           </a:xfrm>
@@ -3985,8 +6031,8 @@
         </p:nvSpPr>
         <p:spPr>
           <a:xfrm>
-            <a:off x="2705100" y="2493334"/>
-            <a:ext cx="5617097" cy="2355539"/>
+            <a:off x="3170267" y="2493334"/>
+            <a:ext cx="4706908" cy="2355539"/>
           </a:xfrm>
           <a:prstGeom prst="rect">
             <a:avLst/>
@@ -5398,7 +7444,7 @@
     </p:spTree>
     <p:extLst>
       <p:ext uri="{BB962C8B-B14F-4D97-AF65-F5344CB8AC3E}">
-        <p14:creationId xmlns:p14="http://schemas.microsoft.com/office/powerpoint/2010/main" val="3847243676"/>
+        <p14:creationId xmlns:p14="http://schemas.microsoft.com/office/powerpoint/2010/main" val="461228426"/>
       </p:ext>
     </p:extLst>
   </p:cSld>

</xml_diff>